<commit_message>
:memo: Update code, add dm test sheet, update some figures
</commit_message>
<xml_diff>
--- a/Codes/diagram2.pptx
+++ b/Codes/diagram2.pptx
@@ -254,7 +254,7 @@
           <a:p>
             <a:fld id="{5E8A7E57-D013-4EF4-93E2-4563A89827F8}" type="datetimeFigureOut">
               <a:rPr lang="pt-BR" smtClean="0"/>
-              <a:t>29/01/2021</a:t>
+              <a:t>02/02/2021</a:t>
             </a:fld>
             <a:endParaRPr lang="pt-BR"/>
           </a:p>
@@ -424,7 +424,7 @@
           <a:p>
             <a:fld id="{5E8A7E57-D013-4EF4-93E2-4563A89827F8}" type="datetimeFigureOut">
               <a:rPr lang="pt-BR" smtClean="0"/>
-              <a:t>29/01/2021</a:t>
+              <a:t>02/02/2021</a:t>
             </a:fld>
             <a:endParaRPr lang="pt-BR"/>
           </a:p>
@@ -604,7 +604,7 @@
           <a:p>
             <a:fld id="{5E8A7E57-D013-4EF4-93E2-4563A89827F8}" type="datetimeFigureOut">
               <a:rPr lang="pt-BR" smtClean="0"/>
-              <a:t>29/01/2021</a:t>
+              <a:t>02/02/2021</a:t>
             </a:fld>
             <a:endParaRPr lang="pt-BR"/>
           </a:p>
@@ -774,7 +774,7 @@
           <a:p>
             <a:fld id="{5E8A7E57-D013-4EF4-93E2-4563A89827F8}" type="datetimeFigureOut">
               <a:rPr lang="pt-BR" smtClean="0"/>
-              <a:t>29/01/2021</a:t>
+              <a:t>02/02/2021</a:t>
             </a:fld>
             <a:endParaRPr lang="pt-BR"/>
           </a:p>
@@ -1018,7 +1018,7 @@
           <a:p>
             <a:fld id="{5E8A7E57-D013-4EF4-93E2-4563A89827F8}" type="datetimeFigureOut">
               <a:rPr lang="pt-BR" smtClean="0"/>
-              <a:t>29/01/2021</a:t>
+              <a:t>02/02/2021</a:t>
             </a:fld>
             <a:endParaRPr lang="pt-BR"/>
           </a:p>
@@ -1250,7 +1250,7 @@
           <a:p>
             <a:fld id="{5E8A7E57-D013-4EF4-93E2-4563A89827F8}" type="datetimeFigureOut">
               <a:rPr lang="pt-BR" smtClean="0"/>
-              <a:t>29/01/2021</a:t>
+              <a:t>02/02/2021</a:t>
             </a:fld>
             <a:endParaRPr lang="pt-BR"/>
           </a:p>
@@ -1617,7 +1617,7 @@
           <a:p>
             <a:fld id="{5E8A7E57-D013-4EF4-93E2-4563A89827F8}" type="datetimeFigureOut">
               <a:rPr lang="pt-BR" smtClean="0"/>
-              <a:t>29/01/2021</a:t>
+              <a:t>02/02/2021</a:t>
             </a:fld>
             <a:endParaRPr lang="pt-BR"/>
           </a:p>
@@ -1735,7 +1735,7 @@
           <a:p>
             <a:fld id="{5E8A7E57-D013-4EF4-93E2-4563A89827F8}" type="datetimeFigureOut">
               <a:rPr lang="pt-BR" smtClean="0"/>
-              <a:t>29/01/2021</a:t>
+              <a:t>02/02/2021</a:t>
             </a:fld>
             <a:endParaRPr lang="pt-BR"/>
           </a:p>
@@ -1830,7 +1830,7 @@
           <a:p>
             <a:fld id="{5E8A7E57-D013-4EF4-93E2-4563A89827F8}" type="datetimeFigureOut">
               <a:rPr lang="pt-BR" smtClean="0"/>
-              <a:t>29/01/2021</a:t>
+              <a:t>02/02/2021</a:t>
             </a:fld>
             <a:endParaRPr lang="pt-BR"/>
           </a:p>
@@ -2107,7 +2107,7 @@
           <a:p>
             <a:fld id="{5E8A7E57-D013-4EF4-93E2-4563A89827F8}" type="datetimeFigureOut">
               <a:rPr lang="pt-BR" smtClean="0"/>
-              <a:t>29/01/2021</a:t>
+              <a:t>02/02/2021</a:t>
             </a:fld>
             <a:endParaRPr lang="pt-BR"/>
           </a:p>
@@ -2364,7 +2364,7 @@
           <a:p>
             <a:fld id="{5E8A7E57-D013-4EF4-93E2-4563A89827F8}" type="datetimeFigureOut">
               <a:rPr lang="pt-BR" smtClean="0"/>
-              <a:t>29/01/2021</a:t>
+              <a:t>02/02/2021</a:t>
             </a:fld>
             <a:endParaRPr lang="pt-BR"/>
           </a:p>
@@ -2577,7 +2577,7 @@
           <a:p>
             <a:fld id="{5E8A7E57-D013-4EF4-93E2-4563A89827F8}" type="datetimeFigureOut">
               <a:rPr lang="pt-BR" smtClean="0"/>
-              <a:t>29/01/2021</a:t>
+              <a:t>02/02/2021</a:t>
             </a:fld>
             <a:endParaRPr lang="pt-BR"/>
           </a:p>
@@ -3098,7 +3098,7 @@
         </p:nvSpPr>
         <p:spPr>
           <a:xfrm rot="5400000">
-            <a:off x="3468084" y="2164506"/>
+            <a:off x="3019667" y="2151714"/>
             <a:ext cx="646331" cy="1041828"/>
           </a:xfrm>
           <a:prstGeom prst="rect">
@@ -3324,7 +3324,7 @@
                 <a:latin typeface="Times New Roman" panose="02020603050405020304" pitchFamily="18" charset="0"/>
                 <a:cs typeface="Times New Roman" panose="02020603050405020304" pitchFamily="18" charset="0"/>
               </a:rPr>
-              <a:t>Performance Metrics</a:t>
+              <a:t>Evaluation phase</a:t>
             </a:r>
           </a:p>
         </p:txBody>
@@ -3670,10 +3670,10 @@
       </p:sp>
       <p:sp>
         <p:nvSpPr>
-          <p:cNvPr id="20" name="Retângulo 19">
+          <p:cNvPr id="56" name="Retângulo 55">
             <a:extLst>
               <a:ext uri="{FF2B5EF4-FFF2-40B4-BE49-F238E27FC236}">
-                <a16:creationId xmlns:a16="http://schemas.microsoft.com/office/drawing/2014/main" id="{02515E8A-A773-451B-BB1D-E8DD96671324}"/>
+                <a16:creationId xmlns:a16="http://schemas.microsoft.com/office/drawing/2014/main" id="{63BDC4B8-88F6-44A4-975B-B2B6179C0EDC}"/>
               </a:ext>
             </a:extLst>
           </p:cNvPr>
@@ -3682,7 +3682,7 @@
         </p:nvSpPr>
         <p:spPr>
           <a:xfrm>
-            <a:off x="2800228" y="3135858"/>
+            <a:off x="2278729" y="3159963"/>
             <a:ext cx="924987" cy="320601"/>
           </a:xfrm>
           <a:prstGeom prst="rect">
@@ -3717,16 +3717,36 @@
           <a:p>
             <a:pPr algn="ctr"/>
             <a:r>
-              <a:rPr lang="pt-BR" sz="1400" dirty="0">
+              <a:rPr lang="pt-BR" sz="1100" dirty="0" err="1">
                 <a:solidFill>
                   <a:schemeClr val="tx1"/>
                 </a:solidFill>
                 <a:latin typeface="Times New Roman" panose="02020603050405020304" pitchFamily="18" charset="0"/>
                 <a:cs typeface="Times New Roman" panose="02020603050405020304" pitchFamily="18" charset="0"/>
               </a:rPr>
-              <a:t>RMSPE</a:t>
-            </a:r>
-            <a:endParaRPr lang="en-US" sz="1400" dirty="0">
+              <a:t>Hypothesis</a:t>
+            </a:r>
+            <a:r>
+              <a:rPr lang="pt-BR" sz="1100" dirty="0">
+                <a:solidFill>
+                  <a:schemeClr val="tx1"/>
+                </a:solidFill>
+                <a:latin typeface="Times New Roman" panose="02020603050405020304" pitchFamily="18" charset="0"/>
+                <a:cs typeface="Times New Roman" panose="02020603050405020304" pitchFamily="18" charset="0"/>
+              </a:rPr>
+              <a:t> </a:t>
+            </a:r>
+            <a:r>
+              <a:rPr lang="pt-BR" sz="1100" dirty="0" err="1">
+                <a:solidFill>
+                  <a:schemeClr val="tx1"/>
+                </a:solidFill>
+                <a:latin typeface="Times New Roman" panose="02020603050405020304" pitchFamily="18" charset="0"/>
+                <a:cs typeface="Times New Roman" panose="02020603050405020304" pitchFamily="18" charset="0"/>
+              </a:rPr>
+              <a:t>test</a:t>
+            </a:r>
+            <a:endParaRPr lang="en-US" sz="1100" dirty="0">
               <a:solidFill>
                 <a:schemeClr val="tx1"/>
               </a:solidFill>
@@ -3738,10 +3758,10 @@
       </p:sp>
       <p:sp>
         <p:nvSpPr>
-          <p:cNvPr id="56" name="Retângulo 55">
+          <p:cNvPr id="58" name="Retângulo 57">
             <a:extLst>
               <a:ext uri="{FF2B5EF4-FFF2-40B4-BE49-F238E27FC236}">
-                <a16:creationId xmlns:a16="http://schemas.microsoft.com/office/drawing/2014/main" id="{63BDC4B8-88F6-44A4-975B-B2B6179C0EDC}"/>
+                <a16:creationId xmlns:a16="http://schemas.microsoft.com/office/drawing/2014/main" id="{BEC54C49-D379-4EF0-AB10-C69784BCF565}"/>
               </a:ext>
             </a:extLst>
           </p:cNvPr>
@@ -3750,7 +3770,7 @@
         </p:nvSpPr>
         <p:spPr>
           <a:xfrm>
-            <a:off x="1721516" y="3135858"/>
+            <a:off x="1200019" y="3159963"/>
             <a:ext cx="924987" cy="320601"/>
           </a:xfrm>
           <a:prstGeom prst="rect">
@@ -3785,84 +3805,26 @@
           <a:p>
             <a:pPr algn="ctr"/>
             <a:r>
-              <a:rPr lang="pt-BR" sz="1400" dirty="0">
+              <a:rPr lang="pt-BR" sz="1100" dirty="0">
                 <a:solidFill>
                   <a:schemeClr val="tx1"/>
                 </a:solidFill>
                 <a:latin typeface="Times New Roman" panose="02020603050405020304" pitchFamily="18" charset="0"/>
                 <a:cs typeface="Times New Roman" panose="02020603050405020304" pitchFamily="18" charset="0"/>
               </a:rPr>
-              <a:t>MAPE</a:t>
-            </a:r>
-            <a:endParaRPr lang="en-US" sz="1400" dirty="0">
-              <a:solidFill>
-                <a:schemeClr val="tx1"/>
-              </a:solidFill>
-              <a:latin typeface="Times New Roman" panose="02020603050405020304" pitchFamily="18" charset="0"/>
-              <a:cs typeface="Times New Roman" panose="02020603050405020304" pitchFamily="18" charset="0"/>
-            </a:endParaRPr>
-          </a:p>
-        </p:txBody>
-      </p:sp>
-      <p:sp>
-        <p:nvSpPr>
-          <p:cNvPr id="58" name="Retângulo 57">
-            <a:extLst>
-              <a:ext uri="{FF2B5EF4-FFF2-40B4-BE49-F238E27FC236}">
-                <a16:creationId xmlns:a16="http://schemas.microsoft.com/office/drawing/2014/main" id="{BEC54C49-D379-4EF0-AB10-C69784BCF565}"/>
-              </a:ext>
-            </a:extLst>
-          </p:cNvPr>
-          <p:cNvSpPr/>
-          <p:nvPr/>
-        </p:nvSpPr>
-        <p:spPr>
-          <a:xfrm>
-            <a:off x="642806" y="3135858"/>
-            <a:ext cx="924987" cy="320601"/>
-          </a:xfrm>
-          <a:prstGeom prst="rect">
-            <a:avLst/>
-          </a:prstGeom>
-          <a:noFill/>
-          <a:ln w="12700">
-            <a:solidFill>
-              <a:schemeClr val="tx1"/>
-            </a:solidFill>
-          </a:ln>
-        </p:spPr>
-        <p:style>
-          <a:lnRef idx="2">
-            <a:schemeClr val="accent1">
-              <a:shade val="50000"/>
-            </a:schemeClr>
-          </a:lnRef>
-          <a:fillRef idx="1">
-            <a:schemeClr val="accent1"/>
-          </a:fillRef>
-          <a:effectRef idx="0">
-            <a:schemeClr val="accent1"/>
-          </a:effectRef>
-          <a:fontRef idx="minor">
-            <a:schemeClr val="lt1"/>
-          </a:fontRef>
-        </p:style>
-        <p:txBody>
-          <a:bodyPr rtlCol="0" anchor="ctr"/>
-          <a:lstStyle/>
-          <a:p>
-            <a:pPr algn="ctr"/>
-            <a:r>
-              <a:rPr lang="pt-BR" sz="1400" dirty="0">
+              <a:t>Performance </a:t>
+            </a:r>
+            <a:r>
+              <a:rPr lang="pt-BR" sz="1100" dirty="0" err="1">
                 <a:solidFill>
                   <a:schemeClr val="tx1"/>
                 </a:solidFill>
                 <a:latin typeface="Times New Roman" panose="02020603050405020304" pitchFamily="18" charset="0"/>
                 <a:cs typeface="Times New Roman" panose="02020603050405020304" pitchFamily="18" charset="0"/>
               </a:rPr>
-              <a:t>IP</a:t>
-            </a:r>
-            <a:endParaRPr lang="en-US" sz="1400" dirty="0">
+              <a:t>metrics</a:t>
+            </a:r>
+            <a:endParaRPr lang="en-US" sz="1100" dirty="0">
               <a:solidFill>
                 <a:schemeClr val="tx1"/>
               </a:solidFill>
@@ -4431,6 +4393,7 @@
             </a:extLst>
           </p:cNvPr>
           <p:cNvCxnSpPr>
+            <a:cxnSpLocks/>
             <a:stCxn id="87" idx="2"/>
             <a:endCxn id="58" idx="0"/>
           </p:cNvCxnSpPr>
@@ -4438,8 +4401,8 @@
         </p:nvCxnSpPr>
         <p:spPr>
           <a:xfrm rot="5400000">
-            <a:off x="1423596" y="2375877"/>
-            <a:ext cx="441678" cy="1078278"/>
+            <a:off x="1690154" y="2666539"/>
+            <a:ext cx="465783" cy="521064"/>
           </a:xfrm>
           <a:prstGeom prst="bentConnector3">
             <a:avLst/>
@@ -4476,6 +4439,7 @@
             </a:extLst>
           </p:cNvPr>
           <p:cNvCxnSpPr>
+            <a:cxnSpLocks/>
             <a:stCxn id="87" idx="2"/>
             <a:endCxn id="56" idx="0"/>
           </p:cNvCxnSpPr>
@@ -4483,53 +4447,8 @@
         </p:nvCxnSpPr>
         <p:spPr>
           <a:xfrm rot="16200000" flipH="1">
-            <a:off x="1962951" y="2914802"/>
-            <a:ext cx="441678" cy="433"/>
-          </a:xfrm>
-          <a:prstGeom prst="bentConnector3">
-            <a:avLst/>
-          </a:prstGeom>
-          <a:ln w="12700">
-            <a:solidFill>
-              <a:schemeClr val="tx1"/>
-            </a:solidFill>
-            <a:tailEnd type="triangle"/>
-          </a:ln>
-        </p:spPr>
-        <p:style>
-          <a:lnRef idx="1">
-            <a:schemeClr val="accent1"/>
-          </a:lnRef>
-          <a:fillRef idx="0">
-            <a:schemeClr val="accent1"/>
-          </a:fillRef>
-          <a:effectRef idx="0">
-            <a:schemeClr val="accent1"/>
-          </a:effectRef>
-          <a:fontRef idx="minor">
-            <a:schemeClr val="tx1"/>
-          </a:fontRef>
-        </p:style>
-      </p:cxnSp>
-      <p:cxnSp>
-        <p:nvCxnSpPr>
-          <p:cNvPr id="94" name="Conector: Angulado 93">
-            <a:extLst>
-              <a:ext uri="{FF2B5EF4-FFF2-40B4-BE49-F238E27FC236}">
-                <a16:creationId xmlns:a16="http://schemas.microsoft.com/office/drawing/2014/main" id="{D933B510-4160-4A85-88F5-E78381EDBDF1}"/>
-              </a:ext>
-            </a:extLst>
-          </p:cNvPr>
-          <p:cNvCxnSpPr>
-            <a:stCxn id="87" idx="2"/>
-            <a:endCxn id="20" idx="0"/>
-          </p:cNvCxnSpPr>
-          <p:nvPr/>
-        </p:nvCxnSpPr>
-        <p:spPr>
-          <a:xfrm rot="16200000" flipH="1">
-            <a:off x="2502307" y="2375446"/>
-            <a:ext cx="441678" cy="1079145"/>
+            <a:off x="2229509" y="2648248"/>
+            <a:ext cx="465783" cy="557646"/>
           </a:xfrm>
           <a:prstGeom prst="bentConnector3">
             <a:avLst/>

</xml_diff>

<commit_message>
:memo: Update codes and figures
</commit_message>
<xml_diff>
--- a/Codes/diagram2.pptx
+++ b/Codes/diagram2.pptx
@@ -2,12 +2,12 @@
 <file path=ppt/presentation.xml><?xml version="1.0" encoding="utf-8"?>
 <p:presentation xmlns:a="http://schemas.openxmlformats.org/drawingml/2006/main" xmlns:r="http://schemas.openxmlformats.org/officeDocument/2006/relationships" xmlns:p="http://schemas.openxmlformats.org/presentationml/2006/main" saveSubsetFonts="1">
   <p:sldMasterIdLst>
-    <p:sldMasterId id="2147483756" r:id="rId1"/>
+    <p:sldMasterId id="2147483780" r:id="rId1"/>
   </p:sldMasterIdLst>
   <p:sldIdLst>
     <p:sldId id="256" r:id="rId2"/>
   </p:sldIdLst>
-  <p:sldSz cx="4319588" cy="3600450"/>
+  <p:sldSz cx="4319588" cy="4319588"/>
   <p:notesSz cx="6858000" cy="9144000"/>
   <p:defaultTextStyle>
     <a:defPPr>
@@ -107,7 +107,7 @@
   <p:extLst>
     <p:ext uri="{EFAFB233-063F-42B5-8137-9DF3F51BA10A}">
       <p15:sldGuideLst xmlns:p15="http://schemas.microsoft.com/office/powerpoint/2012/main">
-        <p15:guide id="1" orient="horz" pos="1134" userDrawn="1">
+        <p15:guide id="1" orient="horz" pos="1361" userDrawn="1">
           <p15:clr>
             <a:srgbClr val="A4A3A4"/>
           </p15:clr>
@@ -152,8 +152,8 @@
         </p:nvSpPr>
         <p:spPr>
           <a:xfrm>
-            <a:off x="323969" y="589241"/>
-            <a:ext cx="3671650" cy="1253490"/>
+            <a:off x="323969" y="706933"/>
+            <a:ext cx="3671650" cy="1503857"/>
           </a:xfrm>
         </p:spPr>
         <p:txBody>
@@ -184,8 +184,8 @@
         </p:nvSpPr>
         <p:spPr>
           <a:xfrm>
-            <a:off x="539949" y="1891070"/>
-            <a:ext cx="3239691" cy="869275"/>
+            <a:off x="539949" y="2268784"/>
+            <a:ext cx="3239691" cy="1042900"/>
           </a:xfrm>
         </p:spPr>
         <p:txBody>
@@ -254,7 +254,7 @@
           <a:p>
             <a:fld id="{5E8A7E57-D013-4EF4-93E2-4563A89827F8}" type="datetimeFigureOut">
               <a:rPr lang="pt-BR" smtClean="0"/>
-              <a:t>02/02/2021</a:t>
+              <a:t>03/02/2021</a:t>
             </a:fld>
             <a:endParaRPr lang="pt-BR"/>
           </a:p>
@@ -305,7 +305,7 @@
     </p:spTree>
     <p:extLst>
       <p:ext uri="{BB962C8B-B14F-4D97-AF65-F5344CB8AC3E}">
-        <p14:creationId xmlns:p14="http://schemas.microsoft.com/office/powerpoint/2010/main" val="2396547493"/>
+        <p14:creationId xmlns:p14="http://schemas.microsoft.com/office/powerpoint/2010/main" val="3120100612"/>
       </p:ext>
     </p:extLst>
   </p:cSld>
@@ -424,7 +424,7 @@
           <a:p>
             <a:fld id="{5E8A7E57-D013-4EF4-93E2-4563A89827F8}" type="datetimeFigureOut">
               <a:rPr lang="pt-BR" smtClean="0"/>
-              <a:t>02/02/2021</a:t>
+              <a:t>03/02/2021</a:t>
             </a:fld>
             <a:endParaRPr lang="pt-BR"/>
           </a:p>
@@ -475,7 +475,7 @@
     </p:spTree>
     <p:extLst>
       <p:ext uri="{BB962C8B-B14F-4D97-AF65-F5344CB8AC3E}">
-        <p14:creationId xmlns:p14="http://schemas.microsoft.com/office/powerpoint/2010/main" val="477002570"/>
+        <p14:creationId xmlns:p14="http://schemas.microsoft.com/office/powerpoint/2010/main" val="320914208"/>
       </p:ext>
     </p:extLst>
   </p:cSld>
@@ -514,8 +514,8 @@
         </p:nvSpPr>
         <p:spPr>
           <a:xfrm>
-            <a:off x="3091205" y="191691"/>
-            <a:ext cx="931411" cy="3051215"/>
+            <a:off x="3091205" y="229978"/>
+            <a:ext cx="931411" cy="3660651"/>
           </a:xfrm>
         </p:spPr>
         <p:txBody>
@@ -542,8 +542,8 @@
         </p:nvSpPr>
         <p:spPr>
           <a:xfrm>
-            <a:off x="296972" y="191691"/>
-            <a:ext cx="2740239" cy="3051215"/>
+            <a:off x="296972" y="229978"/>
+            <a:ext cx="2740239" cy="3660651"/>
           </a:xfrm>
         </p:spPr>
         <p:txBody>
@@ -604,7 +604,7 @@
           <a:p>
             <a:fld id="{5E8A7E57-D013-4EF4-93E2-4563A89827F8}" type="datetimeFigureOut">
               <a:rPr lang="pt-BR" smtClean="0"/>
-              <a:t>02/02/2021</a:t>
+              <a:t>03/02/2021</a:t>
             </a:fld>
             <a:endParaRPr lang="pt-BR"/>
           </a:p>
@@ -655,7 +655,7 @@
     </p:spTree>
     <p:extLst>
       <p:ext uri="{BB962C8B-B14F-4D97-AF65-F5344CB8AC3E}">
-        <p14:creationId xmlns:p14="http://schemas.microsoft.com/office/powerpoint/2010/main" val="883449423"/>
+        <p14:creationId xmlns:p14="http://schemas.microsoft.com/office/powerpoint/2010/main" val="3124016348"/>
       </p:ext>
     </p:extLst>
   </p:cSld>
@@ -774,7 +774,7 @@
           <a:p>
             <a:fld id="{5E8A7E57-D013-4EF4-93E2-4563A89827F8}" type="datetimeFigureOut">
               <a:rPr lang="pt-BR" smtClean="0"/>
-              <a:t>02/02/2021</a:t>
+              <a:t>03/02/2021</a:t>
             </a:fld>
             <a:endParaRPr lang="pt-BR"/>
           </a:p>
@@ -825,7 +825,7 @@
     </p:spTree>
     <p:extLst>
       <p:ext uri="{BB962C8B-B14F-4D97-AF65-F5344CB8AC3E}">
-        <p14:creationId xmlns:p14="http://schemas.microsoft.com/office/powerpoint/2010/main" val="4248751845"/>
+        <p14:creationId xmlns:p14="http://schemas.microsoft.com/office/powerpoint/2010/main" val="2708805326"/>
       </p:ext>
     </p:extLst>
   </p:cSld>
@@ -864,8 +864,8 @@
         </p:nvSpPr>
         <p:spPr>
           <a:xfrm>
-            <a:off x="294722" y="897613"/>
-            <a:ext cx="3725645" cy="1497687"/>
+            <a:off x="294722" y="1076899"/>
+            <a:ext cx="3725645" cy="1796828"/>
           </a:xfrm>
         </p:spPr>
         <p:txBody>
@@ -896,8 +896,8 @@
         </p:nvSpPr>
         <p:spPr>
           <a:xfrm>
-            <a:off x="294722" y="2409469"/>
-            <a:ext cx="3725645" cy="787598"/>
+            <a:off x="294722" y="2890725"/>
+            <a:ext cx="3725645" cy="944910"/>
           </a:xfrm>
         </p:spPr>
         <p:txBody>
@@ -1018,7 +1018,7 @@
           <a:p>
             <a:fld id="{5E8A7E57-D013-4EF4-93E2-4563A89827F8}" type="datetimeFigureOut">
               <a:rPr lang="pt-BR" smtClean="0"/>
-              <a:t>02/02/2021</a:t>
+              <a:t>03/02/2021</a:t>
             </a:fld>
             <a:endParaRPr lang="pt-BR"/>
           </a:p>
@@ -1069,7 +1069,7 @@
     </p:spTree>
     <p:extLst>
       <p:ext uri="{BB962C8B-B14F-4D97-AF65-F5344CB8AC3E}">
-        <p14:creationId xmlns:p14="http://schemas.microsoft.com/office/powerpoint/2010/main" val="1415366157"/>
+        <p14:creationId xmlns:p14="http://schemas.microsoft.com/office/powerpoint/2010/main" val="2375409086"/>
       </p:ext>
     </p:extLst>
   </p:cSld>
@@ -1131,8 +1131,8 @@
         </p:nvSpPr>
         <p:spPr>
           <a:xfrm>
-            <a:off x="296972" y="958453"/>
-            <a:ext cx="1835825" cy="2284452"/>
+            <a:off x="296972" y="1149890"/>
+            <a:ext cx="1835825" cy="2740739"/>
           </a:xfrm>
         </p:spPr>
         <p:txBody>
@@ -1188,8 +1188,8 @@
         </p:nvSpPr>
         <p:spPr>
           <a:xfrm>
-            <a:off x="2186791" y="958453"/>
-            <a:ext cx="1835825" cy="2284452"/>
+            <a:off x="2186791" y="1149890"/>
+            <a:ext cx="1835825" cy="2740739"/>
           </a:xfrm>
         </p:spPr>
         <p:txBody>
@@ -1250,7 +1250,7 @@
           <a:p>
             <a:fld id="{5E8A7E57-D013-4EF4-93E2-4563A89827F8}" type="datetimeFigureOut">
               <a:rPr lang="pt-BR" smtClean="0"/>
-              <a:t>02/02/2021</a:t>
+              <a:t>03/02/2021</a:t>
             </a:fld>
             <a:endParaRPr lang="pt-BR"/>
           </a:p>
@@ -1301,7 +1301,7 @@
     </p:spTree>
     <p:extLst>
       <p:ext uri="{BB962C8B-B14F-4D97-AF65-F5344CB8AC3E}">
-        <p14:creationId xmlns:p14="http://schemas.microsoft.com/office/powerpoint/2010/main" val="1124044607"/>
+        <p14:creationId xmlns:p14="http://schemas.microsoft.com/office/powerpoint/2010/main" val="802838539"/>
       </p:ext>
     </p:extLst>
   </p:cSld>
@@ -1340,8 +1340,8 @@
         </p:nvSpPr>
         <p:spPr>
           <a:xfrm>
-            <a:off x="297534" y="191691"/>
-            <a:ext cx="3725645" cy="695921"/>
+            <a:off x="297534" y="229979"/>
+            <a:ext cx="3725645" cy="834921"/>
           </a:xfrm>
         </p:spPr>
         <p:txBody>
@@ -1368,8 +1368,8 @@
         </p:nvSpPr>
         <p:spPr>
           <a:xfrm>
-            <a:off x="297535" y="882610"/>
-            <a:ext cx="1827388" cy="432554"/>
+            <a:off x="297535" y="1058899"/>
+            <a:ext cx="1827388" cy="518950"/>
           </a:xfrm>
         </p:spPr>
         <p:txBody>
@@ -1433,8 +1433,8 @@
         </p:nvSpPr>
         <p:spPr>
           <a:xfrm>
-            <a:off x="297535" y="1315164"/>
-            <a:ext cx="1827388" cy="1934409"/>
+            <a:off x="297535" y="1577849"/>
+            <a:ext cx="1827388" cy="2320779"/>
           </a:xfrm>
         </p:spPr>
         <p:txBody>
@@ -1490,8 +1490,8 @@
         </p:nvSpPr>
         <p:spPr>
           <a:xfrm>
-            <a:off x="2186791" y="882610"/>
-            <a:ext cx="1836388" cy="432554"/>
+            <a:off x="2186791" y="1058899"/>
+            <a:ext cx="1836388" cy="518950"/>
           </a:xfrm>
         </p:spPr>
         <p:txBody>
@@ -1555,8 +1555,8 @@
         </p:nvSpPr>
         <p:spPr>
           <a:xfrm>
-            <a:off x="2186791" y="1315164"/>
-            <a:ext cx="1836388" cy="1934409"/>
+            <a:off x="2186791" y="1577849"/>
+            <a:ext cx="1836388" cy="2320779"/>
           </a:xfrm>
         </p:spPr>
         <p:txBody>
@@ -1617,7 +1617,7 @@
           <a:p>
             <a:fld id="{5E8A7E57-D013-4EF4-93E2-4563A89827F8}" type="datetimeFigureOut">
               <a:rPr lang="pt-BR" smtClean="0"/>
-              <a:t>02/02/2021</a:t>
+              <a:t>03/02/2021</a:t>
             </a:fld>
             <a:endParaRPr lang="pt-BR"/>
           </a:p>
@@ -1668,7 +1668,7 @@
     </p:spTree>
     <p:extLst>
       <p:ext uri="{BB962C8B-B14F-4D97-AF65-F5344CB8AC3E}">
-        <p14:creationId xmlns:p14="http://schemas.microsoft.com/office/powerpoint/2010/main" val="3954623576"/>
+        <p14:creationId xmlns:p14="http://schemas.microsoft.com/office/powerpoint/2010/main" val="2775487428"/>
       </p:ext>
     </p:extLst>
   </p:cSld>
@@ -1735,7 +1735,7 @@
           <a:p>
             <a:fld id="{5E8A7E57-D013-4EF4-93E2-4563A89827F8}" type="datetimeFigureOut">
               <a:rPr lang="pt-BR" smtClean="0"/>
-              <a:t>02/02/2021</a:t>
+              <a:t>03/02/2021</a:t>
             </a:fld>
             <a:endParaRPr lang="pt-BR"/>
           </a:p>
@@ -1786,7 +1786,7 @@
     </p:spTree>
     <p:extLst>
       <p:ext uri="{BB962C8B-B14F-4D97-AF65-F5344CB8AC3E}">
-        <p14:creationId xmlns:p14="http://schemas.microsoft.com/office/powerpoint/2010/main" val="37064457"/>
+        <p14:creationId xmlns:p14="http://schemas.microsoft.com/office/powerpoint/2010/main" val="2247814009"/>
       </p:ext>
     </p:extLst>
   </p:cSld>
@@ -1830,7 +1830,7 @@
           <a:p>
             <a:fld id="{5E8A7E57-D013-4EF4-93E2-4563A89827F8}" type="datetimeFigureOut">
               <a:rPr lang="pt-BR" smtClean="0"/>
-              <a:t>02/02/2021</a:t>
+              <a:t>03/02/2021</a:t>
             </a:fld>
             <a:endParaRPr lang="pt-BR"/>
           </a:p>
@@ -1881,7 +1881,7 @@
     </p:spTree>
     <p:extLst>
       <p:ext uri="{BB962C8B-B14F-4D97-AF65-F5344CB8AC3E}">
-        <p14:creationId xmlns:p14="http://schemas.microsoft.com/office/powerpoint/2010/main" val="3121571083"/>
+        <p14:creationId xmlns:p14="http://schemas.microsoft.com/office/powerpoint/2010/main" val="3398302784"/>
       </p:ext>
     </p:extLst>
   </p:cSld>
@@ -1920,8 +1920,8 @@
         </p:nvSpPr>
         <p:spPr>
           <a:xfrm>
-            <a:off x="297534" y="240030"/>
-            <a:ext cx="1393180" cy="840105"/>
+            <a:off x="297534" y="287972"/>
+            <a:ext cx="1393180" cy="1007904"/>
           </a:xfrm>
         </p:spPr>
         <p:txBody>
@@ -1952,8 +1952,8 @@
         </p:nvSpPr>
         <p:spPr>
           <a:xfrm>
-            <a:off x="1836388" y="518399"/>
-            <a:ext cx="2186791" cy="2558653"/>
+            <a:off x="1836388" y="621942"/>
+            <a:ext cx="2186791" cy="3069707"/>
           </a:xfrm>
         </p:spPr>
         <p:txBody>
@@ -2037,8 +2037,8 @@
         </p:nvSpPr>
         <p:spPr>
           <a:xfrm>
-            <a:off x="297534" y="1080135"/>
-            <a:ext cx="1393180" cy="2001084"/>
+            <a:off x="297534" y="1295877"/>
+            <a:ext cx="1393180" cy="2400771"/>
           </a:xfrm>
         </p:spPr>
         <p:txBody>
@@ -2107,7 +2107,7 @@
           <a:p>
             <a:fld id="{5E8A7E57-D013-4EF4-93E2-4563A89827F8}" type="datetimeFigureOut">
               <a:rPr lang="pt-BR" smtClean="0"/>
-              <a:t>02/02/2021</a:t>
+              <a:t>03/02/2021</a:t>
             </a:fld>
             <a:endParaRPr lang="pt-BR"/>
           </a:p>
@@ -2158,7 +2158,7 @@
     </p:spTree>
     <p:extLst>
       <p:ext uri="{BB962C8B-B14F-4D97-AF65-F5344CB8AC3E}">
-        <p14:creationId xmlns:p14="http://schemas.microsoft.com/office/powerpoint/2010/main" val="2359621796"/>
+        <p14:creationId xmlns:p14="http://schemas.microsoft.com/office/powerpoint/2010/main" val="839690029"/>
       </p:ext>
     </p:extLst>
   </p:cSld>
@@ -2197,8 +2197,8 @@
         </p:nvSpPr>
         <p:spPr>
           <a:xfrm>
-            <a:off x="297534" y="240030"/>
-            <a:ext cx="1393180" cy="840105"/>
+            <a:off x="297534" y="287972"/>
+            <a:ext cx="1393180" cy="1007904"/>
           </a:xfrm>
         </p:spPr>
         <p:txBody>
@@ -2229,8 +2229,8 @@
         </p:nvSpPr>
         <p:spPr>
           <a:xfrm>
-            <a:off x="1836388" y="518399"/>
-            <a:ext cx="2186791" cy="2558653"/>
+            <a:off x="1836388" y="621942"/>
+            <a:ext cx="2186791" cy="3069707"/>
           </a:xfrm>
         </p:spPr>
         <p:txBody>
@@ -2294,8 +2294,8 @@
         </p:nvSpPr>
         <p:spPr>
           <a:xfrm>
-            <a:off x="297534" y="1080135"/>
-            <a:ext cx="1393180" cy="2001084"/>
+            <a:off x="297534" y="1295877"/>
+            <a:ext cx="1393180" cy="2400771"/>
           </a:xfrm>
         </p:spPr>
         <p:txBody>
@@ -2364,7 +2364,7 @@
           <a:p>
             <a:fld id="{5E8A7E57-D013-4EF4-93E2-4563A89827F8}" type="datetimeFigureOut">
               <a:rPr lang="pt-BR" smtClean="0"/>
-              <a:t>02/02/2021</a:t>
+              <a:t>03/02/2021</a:t>
             </a:fld>
             <a:endParaRPr lang="pt-BR"/>
           </a:p>
@@ -2415,7 +2415,7 @@
     </p:spTree>
     <p:extLst>
       <p:ext uri="{BB962C8B-B14F-4D97-AF65-F5344CB8AC3E}">
-        <p14:creationId xmlns:p14="http://schemas.microsoft.com/office/powerpoint/2010/main" val="3562516643"/>
+        <p14:creationId xmlns:p14="http://schemas.microsoft.com/office/powerpoint/2010/main" val="1708445522"/>
       </p:ext>
     </p:extLst>
   </p:cSld>
@@ -2459,8 +2459,8 @@
         </p:nvSpPr>
         <p:spPr>
           <a:xfrm>
-            <a:off x="296972" y="191691"/>
-            <a:ext cx="3725645" cy="695921"/>
+            <a:off x="296972" y="229979"/>
+            <a:ext cx="3725645" cy="834921"/>
           </a:xfrm>
           <a:prstGeom prst="rect">
             <a:avLst/>
@@ -2492,8 +2492,8 @@
         </p:nvSpPr>
         <p:spPr>
           <a:xfrm>
-            <a:off x="296972" y="958453"/>
-            <a:ext cx="3725645" cy="2284452"/>
+            <a:off x="296972" y="1149890"/>
+            <a:ext cx="3725645" cy="2740739"/>
           </a:xfrm>
           <a:prstGeom prst="rect">
             <a:avLst/>
@@ -2554,8 +2554,8 @@
         </p:nvSpPr>
         <p:spPr>
           <a:xfrm>
-            <a:off x="296972" y="3337084"/>
-            <a:ext cx="971907" cy="191691"/>
+            <a:off x="296972" y="4003619"/>
+            <a:ext cx="971907" cy="229978"/>
           </a:xfrm>
           <a:prstGeom prst="rect">
             <a:avLst/>
@@ -2577,7 +2577,7 @@
           <a:p>
             <a:fld id="{5E8A7E57-D013-4EF4-93E2-4563A89827F8}" type="datetimeFigureOut">
               <a:rPr lang="pt-BR" smtClean="0"/>
-              <a:t>02/02/2021</a:t>
+              <a:t>03/02/2021</a:t>
             </a:fld>
             <a:endParaRPr lang="pt-BR"/>
           </a:p>
@@ -2595,8 +2595,8 @@
         </p:nvSpPr>
         <p:spPr>
           <a:xfrm>
-            <a:off x="1430864" y="3337084"/>
-            <a:ext cx="1457861" cy="191691"/>
+            <a:off x="1430864" y="4003619"/>
+            <a:ext cx="1457861" cy="229978"/>
           </a:xfrm>
           <a:prstGeom prst="rect">
             <a:avLst/>
@@ -2632,8 +2632,8 @@
         </p:nvSpPr>
         <p:spPr>
           <a:xfrm>
-            <a:off x="3050709" y="3337084"/>
-            <a:ext cx="971907" cy="191691"/>
+            <a:off x="3050709" y="4003619"/>
+            <a:ext cx="971907" cy="229978"/>
           </a:xfrm>
           <a:prstGeom prst="rect">
             <a:avLst/>
@@ -2664,23 +2664,23 @@
     </p:spTree>
     <p:extLst>
       <p:ext uri="{BB962C8B-B14F-4D97-AF65-F5344CB8AC3E}">
-        <p14:creationId xmlns:p14="http://schemas.microsoft.com/office/powerpoint/2010/main" val="4284203492"/>
+        <p14:creationId xmlns:p14="http://schemas.microsoft.com/office/powerpoint/2010/main" val="833390676"/>
       </p:ext>
     </p:extLst>
   </p:cSld>
   <p:clrMap bg1="lt1" tx1="dk1" bg2="lt2" tx2="dk2" accent1="accent1" accent2="accent2" accent3="accent3" accent4="accent4" accent5="accent5" accent6="accent6" hlink="hlink" folHlink="folHlink"/>
   <p:sldLayoutIdLst>
-    <p:sldLayoutId id="2147483757" r:id="rId1"/>
-    <p:sldLayoutId id="2147483758" r:id="rId2"/>
-    <p:sldLayoutId id="2147483759" r:id="rId3"/>
-    <p:sldLayoutId id="2147483760" r:id="rId4"/>
-    <p:sldLayoutId id="2147483761" r:id="rId5"/>
-    <p:sldLayoutId id="2147483762" r:id="rId6"/>
-    <p:sldLayoutId id="2147483763" r:id="rId7"/>
-    <p:sldLayoutId id="2147483764" r:id="rId8"/>
-    <p:sldLayoutId id="2147483765" r:id="rId9"/>
-    <p:sldLayoutId id="2147483766" r:id="rId10"/>
-    <p:sldLayoutId id="2147483767" r:id="rId11"/>
+    <p:sldLayoutId id="2147483781" r:id="rId1"/>
+    <p:sldLayoutId id="2147483782" r:id="rId2"/>
+    <p:sldLayoutId id="2147483783" r:id="rId3"/>
+    <p:sldLayoutId id="2147483784" r:id="rId4"/>
+    <p:sldLayoutId id="2147483785" r:id="rId5"/>
+    <p:sldLayoutId id="2147483786" r:id="rId6"/>
+    <p:sldLayoutId id="2147483787" r:id="rId7"/>
+    <p:sldLayoutId id="2147483788" r:id="rId8"/>
+    <p:sldLayoutId id="2147483789" r:id="rId9"/>
+    <p:sldLayoutId id="2147483790" r:id="rId10"/>
+    <p:sldLayoutId id="2147483791" r:id="rId11"/>
   </p:sldLayoutIdLst>
   <p:txStyles>
     <p:titleStyle>
@@ -2996,8 +2996,8 @@
         </p:nvSpPr>
         <p:spPr>
           <a:xfrm>
-            <a:off x="1721347" y="811560"/>
-            <a:ext cx="924987" cy="320601"/>
+            <a:off x="1721353" y="785216"/>
+            <a:ext cx="924987" cy="320600"/>
           </a:xfrm>
           <a:prstGeom prst="rect">
             <a:avLst/>
@@ -3057,8 +3057,8 @@
         </p:nvSpPr>
         <p:spPr>
           <a:xfrm rot="5400000">
-            <a:off x="3598437" y="1640862"/>
-            <a:ext cx="338554" cy="994752"/>
+            <a:off x="3598376" y="1614514"/>
+            <a:ext cx="338682" cy="994752"/>
           </a:xfrm>
           <a:prstGeom prst="rect">
             <a:avLst/>
@@ -3075,7 +3075,7 @@
           <a:lstStyle/>
           <a:p>
             <a:r>
-              <a:rPr lang="en-US" sz="1000" dirty="0">
+              <a:rPr lang="en-US" sz="1001" dirty="0">
                 <a:latin typeface="Times New Roman" panose="02020603050405020304" pitchFamily="18" charset="0"/>
                 <a:cs typeface="Times New Roman" panose="02020603050405020304" pitchFamily="18" charset="0"/>
               </a:rPr>
@@ -3098,8 +3098,8 @@
         </p:nvSpPr>
         <p:spPr>
           <a:xfrm rot="5400000">
-            <a:off x="3019667" y="2151714"/>
-            <a:ext cx="646331" cy="1041828"/>
+            <a:off x="3019479" y="2125365"/>
+            <a:ext cx="646716" cy="1041830"/>
           </a:xfrm>
           <a:prstGeom prst="rect">
             <a:avLst/>
@@ -3116,20 +3116,20 @@
           <a:lstStyle/>
           <a:p>
             <a:r>
-              <a:rPr lang="en-US" sz="1000" dirty="0">
+              <a:rPr lang="en-US" sz="1001" dirty="0">
                 <a:latin typeface="Times New Roman" panose="02020603050405020304" pitchFamily="18" charset="0"/>
                 <a:cs typeface="Times New Roman" panose="02020603050405020304" pitchFamily="18" charset="0"/>
               </a:rPr>
               <a:t>EEMD-BRNN</a:t>
             </a:r>
             <a:br>
-              <a:rPr lang="en-US" sz="1000" dirty="0">
+              <a:rPr lang="en-US" sz="1001" dirty="0">
                 <a:latin typeface="Times New Roman" panose="02020603050405020304" pitchFamily="18" charset="0"/>
                 <a:cs typeface="Times New Roman" panose="02020603050405020304" pitchFamily="18" charset="0"/>
               </a:rPr>
             </a:br>
             <a:r>
-              <a:rPr lang="en-US" sz="1000" dirty="0">
+              <a:rPr lang="en-US" sz="1001" dirty="0">
                 <a:latin typeface="Times New Roman" panose="02020603050405020304" pitchFamily="18" charset="0"/>
                 <a:cs typeface="Times New Roman" panose="02020603050405020304" pitchFamily="18" charset="0"/>
               </a:rPr>
@@ -3138,7 +3138,7 @@
           </a:p>
           <a:p>
             <a:r>
-              <a:rPr lang="en-US" sz="1000" dirty="0">
+              <a:rPr lang="en-US" sz="1001" dirty="0">
                 <a:latin typeface="Times New Roman" panose="02020603050405020304" pitchFamily="18" charset="0"/>
                 <a:cs typeface="Times New Roman" panose="02020603050405020304" pitchFamily="18" charset="0"/>
               </a:rPr>
@@ -3161,8 +3161,8 @@
         </p:nvSpPr>
         <p:spPr>
           <a:xfrm>
-            <a:off x="487312" y="100808"/>
-            <a:ext cx="74498" cy="1201408"/>
+            <a:off x="487314" y="74461"/>
+            <a:ext cx="74498" cy="1201407"/>
           </a:xfrm>
           <a:prstGeom prst="leftBrace">
             <a:avLst>
@@ -3196,7 +3196,7 @@
           <a:lstStyle/>
           <a:p>
             <a:pPr algn="ctr"/>
-            <a:endParaRPr lang="pt-BR" sz="1000" dirty="0">
+            <a:endParaRPr lang="pt-BR" sz="1001" dirty="0">
               <a:latin typeface="Times New Roman" panose="02020603050405020304" pitchFamily="18" charset="0"/>
               <a:cs typeface="Times New Roman" panose="02020603050405020304" pitchFamily="18" charset="0"/>
             </a:endParaRPr>
@@ -3217,8 +3217,8 @@
         </p:nvSpPr>
         <p:spPr>
           <a:xfrm rot="16200000">
-            <a:off x="-408324" y="506866"/>
-            <a:ext cx="1190590" cy="400110"/>
+            <a:off x="-408324" y="480389"/>
+            <a:ext cx="1190590" cy="400366"/>
           </a:xfrm>
           <a:prstGeom prst="rect">
             <a:avLst/>
@@ -3236,7 +3236,7 @@
           <a:p>
             <a:pPr algn="ctr"/>
             <a:r>
-              <a:rPr lang="en-US" sz="1000" dirty="0">
+              <a:rPr lang="en-US" sz="1001" dirty="0">
                 <a:latin typeface="Times New Roman" panose="02020603050405020304" pitchFamily="18" charset="0"/>
                 <a:cs typeface="Times New Roman" panose="02020603050405020304" pitchFamily="18" charset="0"/>
               </a:rPr>
@@ -3259,8 +3259,8 @@
         </p:nvSpPr>
         <p:spPr>
           <a:xfrm rot="16200000">
-            <a:off x="-452332" y="1818667"/>
-            <a:ext cx="1278605" cy="400110"/>
+            <a:off x="-452332" y="1792190"/>
+            <a:ext cx="1278605" cy="400366"/>
           </a:xfrm>
           <a:prstGeom prst="rect">
             <a:avLst/>
@@ -3278,7 +3278,7 @@
           <a:p>
             <a:pPr algn="ctr"/>
             <a:r>
-              <a:rPr lang="en-US" sz="1000" dirty="0">
+              <a:rPr lang="en-US" sz="1001" dirty="0">
                 <a:latin typeface="Times New Roman" panose="02020603050405020304" pitchFamily="18" charset="0"/>
                 <a:cs typeface="Times New Roman" panose="02020603050405020304" pitchFamily="18" charset="0"/>
               </a:rPr>
@@ -3301,8 +3301,8 @@
         </p:nvSpPr>
         <p:spPr>
           <a:xfrm rot="16200000">
-            <a:off x="-245368" y="2967784"/>
-            <a:ext cx="865223" cy="400110"/>
+            <a:off x="-245368" y="2941307"/>
+            <a:ext cx="865223" cy="400366"/>
           </a:xfrm>
           <a:prstGeom prst="rect">
             <a:avLst/>
@@ -3320,7 +3320,7 @@
           <a:p>
             <a:pPr algn="ctr"/>
             <a:r>
-              <a:rPr lang="en-US" sz="1000" dirty="0">
+              <a:rPr lang="en-US" sz="1001" dirty="0">
                 <a:latin typeface="Times New Roman" panose="02020603050405020304" pitchFamily="18" charset="0"/>
                 <a:cs typeface="Times New Roman" panose="02020603050405020304" pitchFamily="18" charset="0"/>
               </a:rPr>
@@ -3343,8 +3343,8 @@
         </p:nvSpPr>
         <p:spPr>
           <a:xfrm>
-            <a:off x="2644890" y="867781"/>
-            <a:ext cx="1674698" cy="400110"/>
+            <a:off x="2644892" y="841436"/>
+            <a:ext cx="1674698" cy="400366"/>
           </a:xfrm>
           <a:prstGeom prst="rect">
             <a:avLst/>
@@ -3361,83 +3361,83 @@
           <a:lstStyle/>
           <a:p>
             <a:r>
-              <a:rPr lang="en-US" sz="1000" dirty="0">
+              <a:rPr lang="en-US" sz="1001" dirty="0">
                 <a:latin typeface="Times New Roman" panose="02020603050405020304" pitchFamily="18" charset="0"/>
                 <a:cs typeface="Times New Roman" panose="02020603050405020304" pitchFamily="18" charset="0"/>
               </a:rPr>
               <a:t>IMF</a:t>
             </a:r>
             <a:r>
-              <a:rPr lang="en-US" sz="1000" baseline="-25000" dirty="0">
+              <a:rPr lang="en-US" sz="1001" baseline="-25000" dirty="0">
                 <a:latin typeface="Times New Roman" panose="02020603050405020304" pitchFamily="18" charset="0"/>
                 <a:cs typeface="Times New Roman" panose="02020603050405020304" pitchFamily="18" charset="0"/>
               </a:rPr>
               <a:t>1</a:t>
             </a:r>
             <a:r>
-              <a:rPr lang="en-US" sz="1000" dirty="0">
+              <a:rPr lang="en-US" sz="1001" dirty="0">
                 <a:latin typeface="Times New Roman" panose="02020603050405020304" pitchFamily="18" charset="0"/>
                 <a:cs typeface="Times New Roman" panose="02020603050405020304" pitchFamily="18" charset="0"/>
               </a:rPr>
               <a:t>, IMF</a:t>
             </a:r>
             <a:r>
-              <a:rPr lang="en-US" sz="1000" baseline="-25000" dirty="0">
+              <a:rPr lang="en-US" sz="1001" baseline="-25000" dirty="0">
                 <a:latin typeface="Times New Roman" panose="02020603050405020304" pitchFamily="18" charset="0"/>
                 <a:cs typeface="Times New Roman" panose="02020603050405020304" pitchFamily="18" charset="0"/>
               </a:rPr>
               <a:t>2</a:t>
             </a:r>
             <a:r>
-              <a:rPr lang="en-US" sz="1000" dirty="0">
+              <a:rPr lang="en-US" sz="1001" dirty="0">
                 <a:latin typeface="Times New Roman" panose="02020603050405020304" pitchFamily="18" charset="0"/>
                 <a:cs typeface="Times New Roman" panose="02020603050405020304" pitchFamily="18" charset="0"/>
               </a:rPr>
               <a:t>, IMF</a:t>
             </a:r>
             <a:r>
-              <a:rPr lang="en-US" sz="1000" baseline="-25000" dirty="0">
+              <a:rPr lang="en-US" sz="1001" baseline="-25000" dirty="0">
                 <a:latin typeface="Times New Roman" panose="02020603050405020304" pitchFamily="18" charset="0"/>
                 <a:cs typeface="Times New Roman" panose="02020603050405020304" pitchFamily="18" charset="0"/>
               </a:rPr>
               <a:t>3</a:t>
             </a:r>
             <a:r>
-              <a:rPr lang="en-US" sz="1000" dirty="0">
+              <a:rPr lang="en-US" sz="1001" dirty="0">
                 <a:latin typeface="Times New Roman" panose="02020603050405020304" pitchFamily="18" charset="0"/>
                 <a:cs typeface="Times New Roman" panose="02020603050405020304" pitchFamily="18" charset="0"/>
               </a:rPr>
               <a:t>, IMF</a:t>
             </a:r>
             <a:r>
-              <a:rPr lang="en-US" sz="1000" baseline="-25000" dirty="0">
+              <a:rPr lang="en-US" sz="1001" baseline="-25000" dirty="0">
                 <a:latin typeface="Times New Roman" panose="02020603050405020304" pitchFamily="18" charset="0"/>
                 <a:cs typeface="Times New Roman" panose="02020603050405020304" pitchFamily="18" charset="0"/>
               </a:rPr>
               <a:t>4</a:t>
             </a:r>
             <a:r>
-              <a:rPr lang="en-US" sz="1000" dirty="0">
+              <a:rPr lang="en-US" sz="1001" dirty="0">
                 <a:latin typeface="Times New Roman" panose="02020603050405020304" pitchFamily="18" charset="0"/>
                 <a:cs typeface="Times New Roman" panose="02020603050405020304" pitchFamily="18" charset="0"/>
               </a:rPr>
               <a:t>, IMF</a:t>
             </a:r>
             <a:r>
-              <a:rPr lang="en-US" sz="1000" baseline="-25000" dirty="0">
+              <a:rPr lang="en-US" sz="1001" baseline="-25000" dirty="0">
                 <a:latin typeface="Times New Roman" panose="02020603050405020304" pitchFamily="18" charset="0"/>
                 <a:cs typeface="Times New Roman" panose="02020603050405020304" pitchFamily="18" charset="0"/>
               </a:rPr>
               <a:t>5</a:t>
             </a:r>
             <a:r>
-              <a:rPr lang="en-US" sz="1000" dirty="0">
+              <a:rPr lang="en-US" sz="1001" dirty="0">
                 <a:latin typeface="Times New Roman" panose="02020603050405020304" pitchFamily="18" charset="0"/>
                 <a:cs typeface="Times New Roman" panose="02020603050405020304" pitchFamily="18" charset="0"/>
               </a:rPr>
               <a:t>, and Residual</a:t>
             </a:r>
-            <a:endParaRPr lang="pt-BR" sz="1000" dirty="0">
+            <a:endParaRPr lang="pt-BR" sz="1001" dirty="0">
               <a:latin typeface="Times New Roman" panose="02020603050405020304" pitchFamily="18" charset="0"/>
               <a:cs typeface="Times New Roman" panose="02020603050405020304" pitchFamily="18" charset="0"/>
             </a:endParaRPr>
@@ -3458,8 +3458,8 @@
         </p:nvSpPr>
         <p:spPr>
           <a:xfrm>
-            <a:off x="650426" y="1614623"/>
-            <a:ext cx="924987" cy="320601"/>
+            <a:off x="650433" y="1588276"/>
+            <a:ext cx="924987" cy="320600"/>
           </a:xfrm>
           <a:prstGeom prst="rect">
             <a:avLst/>
@@ -3519,8 +3519,8 @@
         </p:nvSpPr>
         <p:spPr>
           <a:xfrm>
-            <a:off x="1722786" y="1611302"/>
-            <a:ext cx="924987" cy="320601"/>
+            <a:off x="1722792" y="1584957"/>
+            <a:ext cx="924987" cy="320600"/>
           </a:xfrm>
           <a:prstGeom prst="rect">
             <a:avLst/>
@@ -3580,8 +3580,8 @@
         </p:nvSpPr>
         <p:spPr>
           <a:xfrm>
-            <a:off x="2807847" y="1614623"/>
-            <a:ext cx="924987" cy="320601"/>
+            <a:off x="2807855" y="1588278"/>
+            <a:ext cx="924987" cy="320600"/>
           </a:xfrm>
           <a:prstGeom prst="rect">
             <a:avLst/>
@@ -3641,8 +3641,8 @@
         </p:nvSpPr>
         <p:spPr>
           <a:xfrm rot="5400000">
-            <a:off x="3309248" y="-244510"/>
-            <a:ext cx="338554" cy="1667270"/>
+            <a:off x="3309184" y="-270859"/>
+            <a:ext cx="338682" cy="1667270"/>
           </a:xfrm>
           <a:prstGeom prst="rect">
             <a:avLst/>
@@ -3659,7 +3659,7 @@
           <a:lstStyle/>
           <a:p>
             <a:r>
-              <a:rPr lang="en-US" sz="1000" dirty="0">
+              <a:rPr lang="en-US" sz="1001" dirty="0">
                 <a:latin typeface="Times New Roman" panose="02020603050405020304" pitchFamily="18" charset="0"/>
                 <a:cs typeface="Times New Roman" panose="02020603050405020304" pitchFamily="18" charset="0"/>
               </a:rPr>
@@ -3682,8 +3682,8 @@
         </p:nvSpPr>
         <p:spPr>
           <a:xfrm>
-            <a:off x="2278729" y="3159963"/>
-            <a:ext cx="924987" cy="320601"/>
+            <a:off x="2278735" y="3133617"/>
+            <a:ext cx="924987" cy="320600"/>
           </a:xfrm>
           <a:prstGeom prst="rect">
             <a:avLst/>
@@ -3770,8 +3770,8 @@
         </p:nvSpPr>
         <p:spPr>
           <a:xfrm>
-            <a:off x="1200019" y="3159963"/>
-            <a:ext cx="924987" cy="320601"/>
+            <a:off x="1200027" y="3133617"/>
+            <a:ext cx="924987" cy="320600"/>
           </a:xfrm>
           <a:prstGeom prst="rect">
             <a:avLst/>
@@ -3848,8 +3848,8 @@
         </p:nvSpPr>
         <p:spPr>
           <a:xfrm>
-            <a:off x="1721348" y="111626"/>
-            <a:ext cx="924987" cy="320601"/>
+            <a:off x="1721354" y="85280"/>
+            <a:ext cx="924987" cy="320600"/>
           </a:xfrm>
           <a:prstGeom prst="rect">
             <a:avLst/>
@@ -3909,8 +3909,8 @@
         </p:nvSpPr>
         <p:spPr>
           <a:xfrm>
-            <a:off x="1721083" y="2373579"/>
-            <a:ext cx="924987" cy="320601"/>
+            <a:off x="1721089" y="2347234"/>
+            <a:ext cx="924987" cy="320600"/>
           </a:xfrm>
           <a:prstGeom prst="rect">
             <a:avLst/>
@@ -3944,14 +3944,14 @@
           <a:p>
             <a:pPr algn="ctr"/>
             <a:r>
-              <a:rPr lang="en-US" sz="1400" dirty="0">
+              <a:rPr lang="en-US" sz="1200" dirty="0">
                 <a:solidFill>
                   <a:schemeClr val="tx1"/>
                 </a:solidFill>
                 <a:latin typeface="Times New Roman" panose="02020603050405020304" pitchFamily="18" charset="0"/>
                 <a:cs typeface="Times New Roman" panose="02020603050405020304" pitchFamily="18" charset="0"/>
               </a:rPr>
-              <a:t>∑</a:t>
+              <a:t>Summation</a:t>
             </a:r>
           </a:p>
         </p:txBody>
@@ -3970,7 +3970,7 @@
         </p:nvSpPr>
         <p:spPr>
           <a:xfrm>
-            <a:off x="487312" y="1379419"/>
+            <a:off x="487312" y="1353074"/>
             <a:ext cx="74516" cy="1278607"/>
           </a:xfrm>
           <a:prstGeom prst="leftBrace">
@@ -4005,7 +4005,7 @@
           <a:lstStyle/>
           <a:p>
             <a:pPr algn="ctr"/>
-            <a:endParaRPr lang="pt-BR" sz="1000" dirty="0">
+            <a:endParaRPr lang="pt-BR" sz="1001" dirty="0">
               <a:latin typeface="Times New Roman" panose="02020603050405020304" pitchFamily="18" charset="0"/>
               <a:cs typeface="Times New Roman" panose="02020603050405020304" pitchFamily="18" charset="0"/>
             </a:endParaRPr>
@@ -4026,7 +4026,7 @@
         </p:nvSpPr>
         <p:spPr>
           <a:xfrm>
-            <a:off x="492262" y="2735227"/>
+            <a:off x="492263" y="2708883"/>
             <a:ext cx="69114" cy="815695"/>
           </a:xfrm>
           <a:prstGeom prst="leftBrace">
@@ -4061,7 +4061,7 @@
           <a:lstStyle/>
           <a:p>
             <a:pPr algn="ctr"/>
-            <a:endParaRPr lang="pt-BR" sz="1000" dirty="0">
+            <a:endParaRPr lang="pt-BR" sz="1001" dirty="0">
               <a:latin typeface="Times New Roman" panose="02020603050405020304" pitchFamily="18" charset="0"/>
               <a:cs typeface="Times New Roman" panose="02020603050405020304" pitchFamily="18" charset="0"/>
             </a:endParaRPr>
@@ -4085,8 +4085,8 @@
         </p:nvCxnSpPr>
         <p:spPr>
           <a:xfrm rot="5400000">
-            <a:off x="1994172" y="621894"/>
-            <a:ext cx="379334" cy="1"/>
+            <a:off x="1994174" y="595553"/>
+            <a:ext cx="379333" cy="1"/>
           </a:xfrm>
           <a:prstGeom prst="bentConnector3">
             <a:avLst/>
@@ -4130,8 +4130,8 @@
         </p:nvCxnSpPr>
         <p:spPr>
           <a:xfrm rot="5400000">
-            <a:off x="1407146" y="837928"/>
-            <a:ext cx="482462" cy="1070922"/>
+            <a:off x="1407149" y="811583"/>
+            <a:ext cx="482461" cy="1070923"/>
           </a:xfrm>
           <a:prstGeom prst="bentConnector3">
             <a:avLst/>
@@ -4175,7 +4175,7 @@
         </p:nvCxnSpPr>
         <p:spPr>
           <a:xfrm rot="16200000" flipH="1">
-            <a:off x="1944990" y="1371011"/>
+            <a:off x="1944994" y="1344669"/>
             <a:ext cx="479141" cy="1439"/>
           </a:xfrm>
           <a:prstGeom prst="bentConnector3">
@@ -4220,8 +4220,8 @@
         </p:nvCxnSpPr>
         <p:spPr>
           <a:xfrm rot="16200000" flipH="1">
-            <a:off x="2485857" y="830139"/>
-            <a:ext cx="482462" cy="1086500"/>
+            <a:off x="2485861" y="803793"/>
+            <a:ext cx="482461" cy="1086501"/>
           </a:xfrm>
           <a:prstGeom prst="bentConnector3">
             <a:avLst/>
@@ -4265,7 +4265,7 @@
         </p:nvCxnSpPr>
         <p:spPr>
           <a:xfrm rot="16200000" flipH="1">
-            <a:off x="1429070" y="1619069"/>
+            <a:off x="1429076" y="1592720"/>
             <a:ext cx="438357" cy="1070658"/>
           </a:xfrm>
           <a:prstGeom prst="bentConnector3">
@@ -4310,7 +4310,7 @@
         </p:nvCxnSpPr>
         <p:spPr>
           <a:xfrm rot="5400000">
-            <a:off x="1963587" y="2151889"/>
+            <a:off x="1963590" y="2125546"/>
             <a:ext cx="441678" cy="1703"/>
           </a:xfrm>
           <a:prstGeom prst="bentConnector3">
@@ -4355,7 +4355,7 @@
         </p:nvCxnSpPr>
         <p:spPr>
           <a:xfrm rot="5400000">
-            <a:off x="2507781" y="1611016"/>
+            <a:off x="2507787" y="1584669"/>
             <a:ext cx="438357" cy="1086764"/>
           </a:xfrm>
           <a:prstGeom prst="bentConnector3">
@@ -4401,8 +4401,8 @@
         </p:nvCxnSpPr>
         <p:spPr>
           <a:xfrm rot="5400000">
-            <a:off x="1690154" y="2666539"/>
-            <a:ext cx="465783" cy="521064"/>
+            <a:off x="1690160" y="2640192"/>
+            <a:ext cx="465783" cy="521065"/>
           </a:xfrm>
           <a:prstGeom prst="bentConnector3">
             <a:avLst/>
@@ -4447,7 +4447,7 @@
         </p:nvCxnSpPr>
         <p:spPr>
           <a:xfrm rot="16200000" flipH="1">
-            <a:off x="2229509" y="2648248"/>
+            <a:off x="2229514" y="2621902"/>
             <a:ext cx="465783" cy="557646"/>
           </a:xfrm>
           <a:prstGeom prst="bentConnector3">
@@ -4475,6 +4475,198 @@
           </a:fontRef>
         </p:style>
       </p:cxnSp>
+      <p:sp>
+        <p:nvSpPr>
+          <p:cNvPr id="29" name="Retângulo 28">
+            <a:extLst>
+              <a:ext uri="{FF2B5EF4-FFF2-40B4-BE49-F238E27FC236}">
+                <a16:creationId xmlns:a16="http://schemas.microsoft.com/office/drawing/2014/main" id="{8E94A13E-3DEF-4E14-B3B0-90D7579B6FB5}"/>
+              </a:ext>
+            </a:extLst>
+          </p:cNvPr>
+          <p:cNvSpPr/>
+          <p:nvPr/>
+        </p:nvSpPr>
+        <p:spPr>
+          <a:xfrm>
+            <a:off x="1721089" y="3914873"/>
+            <a:ext cx="924987" cy="320600"/>
+          </a:xfrm>
+          <a:prstGeom prst="rect">
+            <a:avLst/>
+          </a:prstGeom>
+          <a:noFill/>
+          <a:ln w="12700">
+            <a:solidFill>
+              <a:schemeClr val="tx1"/>
+            </a:solidFill>
+          </a:ln>
+        </p:spPr>
+        <p:style>
+          <a:lnRef idx="2">
+            <a:schemeClr val="accent1">
+              <a:shade val="50000"/>
+            </a:schemeClr>
+          </a:lnRef>
+          <a:fillRef idx="1">
+            <a:schemeClr val="accent1"/>
+          </a:fillRef>
+          <a:effectRef idx="0">
+            <a:schemeClr val="accent1"/>
+          </a:effectRef>
+          <a:fontRef idx="minor">
+            <a:schemeClr val="lt1"/>
+          </a:fontRef>
+        </p:style>
+        <p:txBody>
+          <a:bodyPr rtlCol="0" anchor="ctr"/>
+          <a:lstStyle/>
+          <a:p>
+            <a:pPr algn="ctr"/>
+            <a:r>
+              <a:rPr lang="en-US" sz="1200" dirty="0">
+                <a:solidFill>
+                  <a:schemeClr val="tx1"/>
+                </a:solidFill>
+                <a:latin typeface="Times New Roman" panose="02020603050405020304" pitchFamily="18" charset="0"/>
+                <a:cs typeface="Times New Roman" panose="02020603050405020304" pitchFamily="18" charset="0"/>
+              </a:rPr>
+              <a:t>Final result</a:t>
+            </a:r>
+          </a:p>
+        </p:txBody>
+      </p:sp>
+      <p:cxnSp>
+        <p:nvCxnSpPr>
+          <p:cNvPr id="3" name="Conector: Angulado 2">
+            <a:extLst>
+              <a:ext uri="{FF2B5EF4-FFF2-40B4-BE49-F238E27FC236}">
+                <a16:creationId xmlns:a16="http://schemas.microsoft.com/office/drawing/2014/main" id="{C619FA3B-4A8B-4DCD-B89C-37A1B8362FFB}"/>
+              </a:ext>
+            </a:extLst>
+          </p:cNvPr>
+          <p:cNvCxnSpPr>
+            <a:stCxn id="58" idx="2"/>
+            <a:endCxn id="29" idx="0"/>
+          </p:cNvCxnSpPr>
+          <p:nvPr/>
+        </p:nvCxnSpPr>
+        <p:spPr>
+          <a:xfrm rot="16200000" flipH="1">
+            <a:off x="1692722" y="3424015"/>
+            <a:ext cx="460655" cy="521065"/>
+          </a:xfrm>
+          <a:prstGeom prst="bentConnector3">
+            <a:avLst/>
+          </a:prstGeom>
+          <a:ln w="12700">
+            <a:solidFill>
+              <a:schemeClr val="tx1"/>
+            </a:solidFill>
+            <a:tailEnd type="triangle"/>
+          </a:ln>
+        </p:spPr>
+        <p:style>
+          <a:lnRef idx="1">
+            <a:schemeClr val="accent1"/>
+          </a:lnRef>
+          <a:fillRef idx="0">
+            <a:schemeClr val="accent1"/>
+          </a:fillRef>
+          <a:effectRef idx="0">
+            <a:schemeClr val="accent1"/>
+          </a:effectRef>
+          <a:fontRef idx="minor">
+            <a:schemeClr val="tx1"/>
+          </a:fontRef>
+        </p:style>
+      </p:cxnSp>
+      <p:cxnSp>
+        <p:nvCxnSpPr>
+          <p:cNvPr id="5" name="Conector: Angulado 4">
+            <a:extLst>
+              <a:ext uri="{FF2B5EF4-FFF2-40B4-BE49-F238E27FC236}">
+                <a16:creationId xmlns:a16="http://schemas.microsoft.com/office/drawing/2014/main" id="{986787CB-47FB-4245-B169-0E79B7B1C6CD}"/>
+              </a:ext>
+            </a:extLst>
+          </p:cNvPr>
+          <p:cNvCxnSpPr>
+            <a:stCxn id="56" idx="2"/>
+            <a:endCxn id="29" idx="0"/>
+          </p:cNvCxnSpPr>
+          <p:nvPr/>
+        </p:nvCxnSpPr>
+        <p:spPr>
+          <a:xfrm rot="5400000">
+            <a:off x="2232077" y="3405723"/>
+            <a:ext cx="460655" cy="557646"/>
+          </a:xfrm>
+          <a:prstGeom prst="bentConnector3">
+            <a:avLst/>
+          </a:prstGeom>
+          <a:ln w="12700">
+            <a:solidFill>
+              <a:schemeClr val="tx1"/>
+            </a:solidFill>
+            <a:tailEnd type="triangle"/>
+          </a:ln>
+        </p:spPr>
+        <p:style>
+          <a:lnRef idx="1">
+            <a:schemeClr val="accent1"/>
+          </a:lnRef>
+          <a:fillRef idx="0">
+            <a:schemeClr val="accent1"/>
+          </a:fillRef>
+          <a:effectRef idx="0">
+            <a:schemeClr val="accent1"/>
+          </a:effectRef>
+          <a:fontRef idx="minor">
+            <a:schemeClr val="tx1"/>
+          </a:fontRef>
+        </p:style>
+      </p:cxnSp>
+      <p:sp>
+        <p:nvSpPr>
+          <p:cNvPr id="34" name="Retângulo 33">
+            <a:extLst>
+              <a:ext uri="{FF2B5EF4-FFF2-40B4-BE49-F238E27FC236}">
+                <a16:creationId xmlns:a16="http://schemas.microsoft.com/office/drawing/2014/main" id="{2FE705BD-C29E-4900-B2D0-EB892651BF29}"/>
+              </a:ext>
+            </a:extLst>
+          </p:cNvPr>
+          <p:cNvSpPr/>
+          <p:nvPr/>
+        </p:nvSpPr>
+        <p:spPr>
+          <a:xfrm rot="5400000">
+            <a:off x="3115380" y="3244394"/>
+            <a:ext cx="338682" cy="994752"/>
+          </a:xfrm>
+          <a:prstGeom prst="rect">
+            <a:avLst/>
+          </a:prstGeom>
+          <a:noFill/>
+          <a:ln w="12700">
+            <a:noFill/>
+          </a:ln>
+        </p:spPr>
+        <p:txBody>
+          <a:bodyPr vert="vert270" wrap="square">
+            <a:spAutoFit/>
+          </a:bodyPr>
+          <a:lstStyle/>
+          <a:p>
+            <a:r>
+              <a:rPr lang="en-US" sz="1001" dirty="0">
+                <a:latin typeface="Times New Roman" panose="02020603050405020304" pitchFamily="18" charset="0"/>
+                <a:cs typeface="Times New Roman" panose="02020603050405020304" pitchFamily="18" charset="0"/>
+              </a:rPr>
+              <a:t>Final prediction</a:t>
+            </a:r>
+          </a:p>
+        </p:txBody>
+      </p:sp>
     </p:spTree>
     <p:extLst>
       <p:ext uri="{BB962C8B-B14F-4D97-AF65-F5344CB8AC3E}">

</xml_diff>